<commit_message>
feat: get positional content information from slide
return by dictiary form. relative postion are given based on lefttop shape.
</commit_message>
<xml_diff>
--- a/example/nametag-example.pptx
+++ b/example/nametag-example.pptx
@@ -5,10 +5,11 @@
     <p:sldMasterId id="2147483660" r:id="rId1"/>
   </p:sldMasterIdLst>
   <p:handoutMasterIdLst>
-    <p:handoutMasterId r:id="rId3"/>
+    <p:handoutMasterId r:id="rId4"/>
   </p:handoutMasterIdLst>
   <p:sldIdLst>
     <p:sldId id="257" r:id="rId2"/>
+    <p:sldId id="258" r:id="rId3"/>
   </p:sldIdLst>
   <p:sldSz cx="6858000" cy="9906000" type="A4"/>
   <p:notesSz cx="6888163" cy="10020300"/>
@@ -1233,6 +1234,172 @@
     <p:extLst>
       <p:ext uri="{BB962C8B-B14F-4D97-AF65-F5344CB8AC3E}">
         <p14:creationId xmlns:p14="http://schemas.microsoft.com/office/powerpoint/2010/main" val="371569993"/>
+      </p:ext>
+    </p:extLst>
+  </p:cSld>
+  <p:clrMapOvr>
+    <a:masterClrMapping/>
+  </p:clrMapOvr>
+</p:sld>
+</file>
+
+<file path=ppt/slides/slide2.xml><?xml version="1.0" encoding="utf-8"?>
+<p:sld xmlns:a="http://schemas.openxmlformats.org/drawingml/2006/main" xmlns:r="http://schemas.openxmlformats.org/officeDocument/2006/relationships" xmlns:p="http://schemas.openxmlformats.org/presentationml/2006/main">
+  <p:cSld>
+    <p:spTree>
+      <p:nvGrpSpPr>
+        <p:cNvPr id="1" name="">
+          <a:extLst>
+            <a:ext uri="{FF2B5EF4-FFF2-40B4-BE49-F238E27FC236}">
+              <a16:creationId xmlns:a16="http://schemas.microsoft.com/office/drawing/2014/main" id="{905CCD32-1563-5072-B939-60E851CF2560}"/>
+            </a:ext>
+          </a:extLst>
+        </p:cNvPr>
+        <p:cNvGrpSpPr/>
+        <p:nvPr/>
+      </p:nvGrpSpPr>
+      <p:grpSpPr>
+        <a:xfrm>
+          <a:off x="0" y="0"/>
+          <a:ext cx="0" cy="0"/>
+          <a:chOff x="0" y="0"/>
+          <a:chExt cx="0" cy="0"/>
+        </a:xfrm>
+      </p:grpSpPr>
+      <p:pic>
+        <p:nvPicPr>
+          <p:cNvPr id="5" name="그림 개체 틀 4">
+            <a:extLst>
+              <a:ext uri="{FF2B5EF4-FFF2-40B4-BE49-F238E27FC236}">
+                <a16:creationId xmlns:a16="http://schemas.microsoft.com/office/drawing/2014/main" id="{0F7319E5-04E1-CF2A-E60C-B071647C703D}"/>
+              </a:ext>
+            </a:extLst>
+          </p:cNvPr>
+          <p:cNvPicPr>
+            <a:picLocks noGrp="1" noChangeAspect="1"/>
+          </p:cNvPicPr>
+          <p:nvPr>
+            <p:ph type="pic" sz="quarter" idx="16"/>
+          </p:nvPr>
+        </p:nvPicPr>
+        <p:blipFill>
+          <a:blip r:embed="rId2">
+            <a:extLst>
+              <a:ext uri="{28A0092B-C50C-407E-A947-70E740481C1C}">
+                <a14:useLocalDpi xmlns:a14="http://schemas.microsoft.com/office/drawing/2010/main" val="0"/>
+              </a:ext>
+            </a:extLst>
+          </a:blip>
+          <a:srcRect t="384" b="384"/>
+          <a:stretch>
+            <a:fillRect/>
+          </a:stretch>
+        </p:blipFill>
+        <p:spPr/>
+      </p:pic>
+      <p:sp>
+        <p:nvSpPr>
+          <p:cNvPr id="12" name="TextBox 11">
+            <a:extLst>
+              <a:ext uri="{FF2B5EF4-FFF2-40B4-BE49-F238E27FC236}">
+                <a16:creationId xmlns:a16="http://schemas.microsoft.com/office/drawing/2014/main" id="{757ED8EC-41DC-1BAE-D1FE-F4BB82482B24}"/>
+              </a:ext>
+            </a:extLst>
+          </p:cNvPr>
+          <p:cNvSpPr txBox="1"/>
+          <p:nvPr/>
+        </p:nvSpPr>
+        <p:spPr>
+          <a:xfrm>
+            <a:off x="2721114" y="4015438"/>
+            <a:ext cx="1415773" cy="584775"/>
+          </a:xfrm>
+          <a:prstGeom prst="rect">
+            <a:avLst/>
+          </a:prstGeom>
+          <a:noFill/>
+        </p:spPr>
+        <p:txBody>
+          <a:bodyPr wrap="none">
+            <a:spAutoFit/>
+          </a:bodyPr>
+          <a:lstStyle/>
+          <a:p>
+            <a:pPr algn="ctr"/>
+            <a:r>
+              <a:rPr lang="ko-KR" altLang="en-US" sz="3200" dirty="0">
+                <a:latin typeface="조선신명조"/>
+              </a:rPr>
+              <a:t>민경현</a:t>
+            </a:r>
+            <a:endParaRPr sz="3200" dirty="0">
+              <a:latin typeface="조선신명조"/>
+            </a:endParaRPr>
+          </a:p>
+        </p:txBody>
+      </p:sp>
+      <p:sp>
+        <p:nvSpPr>
+          <p:cNvPr id="13" name="TextBox 12">
+            <a:extLst>
+              <a:ext uri="{FF2B5EF4-FFF2-40B4-BE49-F238E27FC236}">
+                <a16:creationId xmlns:a16="http://schemas.microsoft.com/office/drawing/2014/main" id="{94203D19-C2E4-08B1-805F-48B30AC66266}"/>
+              </a:ext>
+            </a:extLst>
+          </p:cNvPr>
+          <p:cNvSpPr txBox="1"/>
+          <p:nvPr/>
+        </p:nvSpPr>
+        <p:spPr>
+          <a:xfrm>
+            <a:off x="1947863" y="6621397"/>
+            <a:ext cx="1547218" cy="338554"/>
+          </a:xfrm>
+          <a:prstGeom prst="rect">
+            <a:avLst/>
+          </a:prstGeom>
+          <a:noFill/>
+        </p:spPr>
+        <p:txBody>
+          <a:bodyPr wrap="none" rtlCol="0">
+            <a:spAutoFit/>
+          </a:bodyPr>
+          <a:lstStyle/>
+          <a:p>
+            <a:r>
+              <a:rPr lang="ko-KR" altLang="en-US" sz="1600" dirty="0">
+                <a:solidFill>
+                  <a:srgbClr val="C43F1D"/>
+                </a:solidFill>
+                <a:latin typeface="조선신명조" panose="02030504000101010101" pitchFamily="18" charset="-127"/>
+                <a:ea typeface="조선신명조" panose="02030504000101010101" pitchFamily="18" charset="-127"/>
+              </a:rPr>
+              <a:t>아주대 </a:t>
+            </a:r>
+            <a:r>
+              <a:rPr lang="ko-KR" altLang="en-US" sz="1600" dirty="0" err="1">
+                <a:solidFill>
+                  <a:srgbClr val="C43F1D"/>
+                </a:solidFill>
+                <a:latin typeface="조선신명조" panose="02030504000101010101" pitchFamily="18" charset="-127"/>
+                <a:ea typeface="조선신명조" panose="02030504000101010101" pitchFamily="18" charset="-127"/>
+              </a:rPr>
+              <a:t>예비순장</a:t>
+            </a:r>
+            <a:endParaRPr lang="ko-KR" altLang="en-US" sz="1600" dirty="0">
+              <a:solidFill>
+                <a:srgbClr val="C43F1D"/>
+              </a:solidFill>
+              <a:latin typeface="조선신명조" panose="02030504000101010101" pitchFamily="18" charset="-127"/>
+              <a:ea typeface="조선신명조" panose="02030504000101010101" pitchFamily="18" charset="-127"/>
+            </a:endParaRPr>
+          </a:p>
+        </p:txBody>
+      </p:sp>
+    </p:spTree>
+    <p:extLst>
+      <p:ext uri="{BB962C8B-B14F-4D97-AF65-F5344CB8AC3E}">
+        <p14:creationId xmlns:p14="http://schemas.microsoft.com/office/powerpoint/2010/main" val="1222442894"/>
       </p:ext>
     </p:extLst>
   </p:cSld>

</xml_diff>

<commit_message>
feat: add excel example
update ppt layout & sample nametag text
</commit_message>
<xml_diff>
--- a/example/nametag-example.pptx
+++ b/example/nametag-example.pptx
@@ -225,7 +225,7 @@
           <a:p>
             <a:fld id="{8EC2616C-06E9-49BB-A519-209A8D4F15AE}" type="datetimeFigureOut">
               <a:rPr lang="ko-KR" altLang="en-US" smtClean="0"/>
-              <a:t>2024-02-10</a:t>
+              <a:t>2024-02-11</a:t>
             </a:fld>
             <a:endParaRPr lang="ko-KR" altLang="en-US"/>
           </a:p>
@@ -321,6 +321,36 @@
 </file>
 
 <file path=ppt/slideLayouts/slideLayout1.xml><?xml version="1.0" encoding="utf-8"?>
+<p:sldLayout xmlns:a="http://schemas.openxmlformats.org/drawingml/2006/main" xmlns:r="http://schemas.openxmlformats.org/officeDocument/2006/relationships" xmlns:p="http://schemas.openxmlformats.org/presentationml/2006/main" preserve="1" userDrawn="1">
+  <p:cSld name="1_Sampel NameTag">
+    <p:spTree>
+      <p:nvGrpSpPr>
+        <p:cNvPr id="1" name=""/>
+        <p:cNvGrpSpPr/>
+        <p:nvPr/>
+      </p:nvGrpSpPr>
+      <p:grpSpPr>
+        <a:xfrm>
+          <a:off x="0" y="0"/>
+          <a:ext cx="0" cy="0"/>
+          <a:chOff x="0" y="0"/>
+          <a:chExt cx="0" cy="0"/>
+        </a:xfrm>
+      </p:grpSpPr>
+    </p:spTree>
+    <p:extLst>
+      <p:ext uri="{BB962C8B-B14F-4D97-AF65-F5344CB8AC3E}">
+        <p14:creationId xmlns:p14="http://schemas.microsoft.com/office/powerpoint/2010/main" val="3754887677"/>
+      </p:ext>
+    </p:extLst>
+  </p:cSld>
+  <p:clrMapOvr>
+    <a:masterClrMapping/>
+  </p:clrMapOvr>
+</p:sldLayout>
+</file>
+
+<file path=ppt/slideLayouts/slideLayout2.xml><?xml version="1.0" encoding="utf-8"?>
 <p:sldLayout xmlns:a="http://schemas.openxmlformats.org/drawingml/2006/main" xmlns:r="http://schemas.openxmlformats.org/officeDocument/2006/relationships" xmlns:p="http://schemas.openxmlformats.org/presentationml/2006/main" preserve="1" userDrawn="1">
   <p:cSld name="Sampel NameTag">
     <p:spTree>
@@ -416,7 +446,7 @@
 </p:sldLayout>
 </file>
 
-<file path=ppt/slideLayouts/slideLayout2.xml><?xml version="1.0" encoding="utf-8"?>
+<file path=ppt/slideLayouts/slideLayout3.xml><?xml version="1.0" encoding="utf-8"?>
 <p:sldLayout xmlns:a="http://schemas.openxmlformats.org/drawingml/2006/main" xmlns:r="http://schemas.openxmlformats.org/officeDocument/2006/relationships" xmlns:p="http://schemas.openxmlformats.org/presentationml/2006/main" preserve="1" userDrawn="1">
   <p:cSld name="2_콘텐츠 2개">
     <p:spTree>
@@ -718,7 +748,7 @@
           <a:p>
             <a:fld id="{17A1B1BA-F0E4-4197-9299-0B2B9E3620EE}" type="datetimeFigureOut">
               <a:rPr lang="ko-KR" altLang="en-US" smtClean="0"/>
-              <a:t>2024-02-10</a:t>
+              <a:t>2024-02-11</a:t>
             </a:fld>
             <a:endParaRPr lang="ko-KR" altLang="en-US"/>
           </a:p>
@@ -811,8 +841,9 @@
   </p:cSld>
   <p:clrMap bg1="lt1" tx1="dk1" bg2="lt2" tx2="dk2" accent1="accent1" accent2="accent2" accent3="accent3" accent4="accent4" accent5="accent5" accent6="accent6" hlink="hlink" folHlink="folHlink"/>
   <p:sldLayoutIdLst>
-    <p:sldLayoutId id="2147483674" r:id="rId1"/>
-    <p:sldLayoutId id="2147483673" r:id="rId2"/>
+    <p:sldLayoutId id="2147483675" r:id="rId1"/>
+    <p:sldLayoutId id="2147483674" r:id="rId2"/>
+    <p:sldLayoutId id="2147483673" r:id="rId3"/>
   </p:sldLayoutIdLst>
   <p:txStyles>
     <p:titleStyle>
@@ -1162,8 +1193,8 @@
         </p:nvSpPr>
         <p:spPr>
           <a:xfrm>
-            <a:off x="2721114" y="4015438"/>
-            <a:ext cx="1415773" cy="584775"/>
+            <a:off x="2926299" y="4015438"/>
+            <a:ext cx="1005403" cy="584775"/>
           </a:xfrm>
           <a:prstGeom prst="rect">
             <a:avLst/>
@@ -1181,7 +1212,7 @@
               <a:rPr lang="ko-KR" altLang="en-US" sz="3200" dirty="0">
                 <a:latin typeface="조선신명조"/>
               </a:rPr>
-              <a:t>민경현</a:t>
+              <a:t>이름</a:t>
             </a:r>
             <a:endParaRPr sz="3200" dirty="0">
               <a:latin typeface="조선신명조"/>
@@ -1225,7 +1256,7 @@
                 <a:latin typeface="조선신명조" panose="02030504000101010101" pitchFamily="18" charset="-127"/>
                 <a:ea typeface="조선신명조" panose="02030504000101010101" pitchFamily="18" charset="-127"/>
               </a:rPr>
-              <a:t>아주대 순장</a:t>
+              <a:t>캠퍼스 역할</a:t>
             </a:r>
           </a:p>
         </p:txBody>
@@ -1311,8 +1342,8 @@
         </p:nvSpPr>
         <p:spPr>
           <a:xfrm>
-            <a:off x="2721114" y="4015438"/>
-            <a:ext cx="1415773" cy="584775"/>
+            <a:off x="2926299" y="4015438"/>
+            <a:ext cx="1005403" cy="584775"/>
           </a:xfrm>
           <a:prstGeom prst="rect">
             <a:avLst/>
@@ -1330,7 +1361,7 @@
               <a:rPr lang="ko-KR" altLang="en-US" sz="3200" dirty="0">
                 <a:latin typeface="조선신명조"/>
               </a:rPr>
-              <a:t>민경현</a:t>
+              <a:t>이름</a:t>
             </a:r>
             <a:endParaRPr sz="3200" dirty="0">
               <a:latin typeface="조선신명조"/>
@@ -1353,7 +1384,7 @@
         <p:spPr>
           <a:xfrm>
             <a:off x="1947863" y="6621397"/>
-            <a:ext cx="1547218" cy="338554"/>
+            <a:ext cx="1175322" cy="338554"/>
           </a:xfrm>
           <a:prstGeom prst="rect">
             <a:avLst/>
@@ -1374,25 +1405,8 @@
                 <a:latin typeface="조선신명조" panose="02030504000101010101" pitchFamily="18" charset="-127"/>
                 <a:ea typeface="조선신명조" panose="02030504000101010101" pitchFamily="18" charset="-127"/>
               </a:rPr>
-              <a:t>아주대 </a:t>
+              <a:t>캠퍼스 역할</a:t>
             </a:r>
-            <a:r>
-              <a:rPr lang="ko-KR" altLang="en-US" sz="1600" dirty="0" err="1">
-                <a:solidFill>
-                  <a:srgbClr val="C43F1D"/>
-                </a:solidFill>
-                <a:latin typeface="조선신명조" panose="02030504000101010101" pitchFamily="18" charset="-127"/>
-                <a:ea typeface="조선신명조" panose="02030504000101010101" pitchFamily="18" charset="-127"/>
-              </a:rPr>
-              <a:t>예비순장</a:t>
-            </a:r>
-            <a:endParaRPr lang="ko-KR" altLang="en-US" sz="1600" dirty="0">
-              <a:solidFill>
-                <a:srgbClr val="C43F1D"/>
-              </a:solidFill>
-              <a:latin typeface="조선신명조" panose="02030504000101010101" pitchFamily="18" charset="-127"/>
-              <a:ea typeface="조선신명조" panose="02030504000101010101" pitchFamily="18" charset="-127"/>
-            </a:endParaRPr>
           </a:p>
         </p:txBody>
       </p:sp>

</xml_diff>

<commit_message>
feat: apply asian font
</commit_message>
<xml_diff>
--- a/example/nametag-example.pptx
+++ b/example/nametag-example.pptx
@@ -225,7 +225,7 @@
           <a:p>
             <a:fld id="{8EC2616C-06E9-49BB-A519-209A8D4F15AE}" type="datetimeFigureOut">
               <a:rPr lang="ko-KR" altLang="en-US" smtClean="0"/>
-              <a:t>2024-02-11</a:t>
+              <a:t>2024-02-15</a:t>
             </a:fld>
             <a:endParaRPr lang="ko-KR" altLang="en-US"/>
           </a:p>
@@ -748,7 +748,7 @@
           <a:p>
             <a:fld id="{17A1B1BA-F0E4-4197-9299-0B2B9E3620EE}" type="datetimeFigureOut">
               <a:rPr lang="ko-KR" altLang="en-US" smtClean="0"/>
-              <a:t>2024-02-11</a:t>
+              <a:t>2024-02-15</a:t>
             </a:fld>
             <a:endParaRPr lang="ko-KR" altLang="en-US"/>
           </a:p>
@@ -1193,8 +1193,8 @@
         </p:nvSpPr>
         <p:spPr>
           <a:xfrm>
-            <a:off x="2926299" y="4015438"/>
-            <a:ext cx="1005403" cy="584775"/>
+            <a:off x="2557908" y="4015438"/>
+            <a:ext cx="1742183" cy="584775"/>
           </a:xfrm>
           <a:prstGeom prst="rect">
             <a:avLst/>
@@ -1202,7 +1202,7 @@
           <a:noFill/>
         </p:spPr>
         <p:txBody>
-          <a:bodyPr wrap="none">
+          <a:bodyPr wrap="square">
             <a:spAutoFit/>
           </a:bodyPr>
           <a:lstStyle/>
@@ -1210,12 +1210,14 @@
             <a:pPr algn="ctr"/>
             <a:r>
               <a:rPr lang="ko-KR" altLang="en-US" sz="3200" dirty="0">
-                <a:latin typeface="조선신명조"/>
+                <a:latin typeface="HY엽서L" panose="02030600000101010101" pitchFamily="18" charset="-127"/>
+                <a:ea typeface="HY엽서L" panose="02030600000101010101" pitchFamily="18" charset="-127"/>
               </a:rPr>
               <a:t>이름</a:t>
             </a:r>
             <a:endParaRPr sz="3200" dirty="0">
-              <a:latin typeface="조선신명조"/>
+              <a:latin typeface="HY엽서L" panose="02030600000101010101" pitchFamily="18" charset="-127"/>
+              <a:ea typeface="HY엽서L" panose="02030600000101010101" pitchFamily="18" charset="-127"/>
             </a:endParaRPr>
           </a:p>
         </p:txBody>
@@ -1330,47 +1332,6 @@
       </p:pic>
       <p:sp>
         <p:nvSpPr>
-          <p:cNvPr id="12" name="TextBox 11">
-            <a:extLst>
-              <a:ext uri="{FF2B5EF4-FFF2-40B4-BE49-F238E27FC236}">
-                <a16:creationId xmlns:a16="http://schemas.microsoft.com/office/drawing/2014/main" id="{757ED8EC-41DC-1BAE-D1FE-F4BB82482B24}"/>
-              </a:ext>
-            </a:extLst>
-          </p:cNvPr>
-          <p:cNvSpPr txBox="1"/>
-          <p:nvPr/>
-        </p:nvSpPr>
-        <p:spPr>
-          <a:xfrm>
-            <a:off x="2926299" y="4015438"/>
-            <a:ext cx="1005403" cy="584775"/>
-          </a:xfrm>
-          <a:prstGeom prst="rect">
-            <a:avLst/>
-          </a:prstGeom>
-          <a:noFill/>
-        </p:spPr>
-        <p:txBody>
-          <a:bodyPr wrap="none">
-            <a:spAutoFit/>
-          </a:bodyPr>
-          <a:lstStyle/>
-          <a:p>
-            <a:pPr algn="ctr"/>
-            <a:r>
-              <a:rPr lang="ko-KR" altLang="en-US" sz="3200" dirty="0">
-                <a:latin typeface="조선신명조"/>
-              </a:rPr>
-              <a:t>이름</a:t>
-            </a:r>
-            <a:endParaRPr sz="3200" dirty="0">
-              <a:latin typeface="조선신명조"/>
-            </a:endParaRPr>
-          </a:p>
-        </p:txBody>
-      </p:sp>
-      <p:sp>
-        <p:nvSpPr>
           <p:cNvPr id="13" name="TextBox 12">
             <a:extLst>
               <a:ext uri="{FF2B5EF4-FFF2-40B4-BE49-F238E27FC236}">
@@ -1407,6 +1368,49 @@
               </a:rPr>
               <a:t>캠퍼스 역할</a:t>
             </a:r>
+          </a:p>
+        </p:txBody>
+      </p:sp>
+      <p:sp>
+        <p:nvSpPr>
+          <p:cNvPr id="3" name="TextBox 2">
+            <a:extLst>
+              <a:ext uri="{FF2B5EF4-FFF2-40B4-BE49-F238E27FC236}">
+                <a16:creationId xmlns:a16="http://schemas.microsoft.com/office/drawing/2014/main" id="{7B03755D-B2AB-93E1-6884-C4839502380C}"/>
+              </a:ext>
+            </a:extLst>
+          </p:cNvPr>
+          <p:cNvSpPr txBox="1"/>
+          <p:nvPr/>
+        </p:nvSpPr>
+        <p:spPr>
+          <a:xfrm>
+            <a:off x="2557908" y="4015438"/>
+            <a:ext cx="1742183" cy="584775"/>
+          </a:xfrm>
+          <a:prstGeom prst="rect">
+            <a:avLst/>
+          </a:prstGeom>
+          <a:noFill/>
+        </p:spPr>
+        <p:txBody>
+          <a:bodyPr wrap="square">
+            <a:spAutoFit/>
+          </a:bodyPr>
+          <a:lstStyle/>
+          <a:p>
+            <a:pPr algn="ctr"/>
+            <a:r>
+              <a:rPr lang="ko-KR" altLang="en-US" sz="3200" dirty="0">
+                <a:latin typeface="조선신명조" panose="02030504000101010101" pitchFamily="18" charset="-127"/>
+                <a:ea typeface="조선신명조" panose="02030504000101010101" pitchFamily="18" charset="-127"/>
+              </a:rPr>
+              <a:t>이름</a:t>
+            </a:r>
+            <a:endParaRPr sz="3200" dirty="0">
+              <a:latin typeface="조선신명조" panose="02030504000101010101" pitchFamily="18" charset="-127"/>
+              <a:ea typeface="조선신명조" panose="02030504000101010101" pitchFamily="18" charset="-127"/>
+            </a:endParaRPr>
           </a:p>
         </p:txBody>
       </p:sp>

</xml_diff>

<commit_message>
update example to anonymous
</commit_message>
<xml_diff>
--- a/example/nametag-example.pptx
+++ b/example/nametag-example.pptx
@@ -225,7 +225,7 @@
           <a:p>
             <a:fld id="{8EC2616C-06E9-49BB-A519-209A8D4F15AE}" type="datetimeFigureOut">
               <a:rPr lang="ko-KR" altLang="en-US" smtClean="0"/>
-              <a:t>2024-02-15</a:t>
+              <a:t>2024-03-12</a:t>
             </a:fld>
             <a:endParaRPr lang="ko-KR" altLang="en-US"/>
           </a:p>
@@ -748,7 +748,7 @@
           <a:p>
             <a:fld id="{17A1B1BA-F0E4-4197-9299-0B2B9E3620EE}" type="datetimeFigureOut">
               <a:rPr lang="ko-KR" altLang="en-US" smtClean="0"/>
-              <a:t>2024-02-15</a:t>
+              <a:t>2024-03-12</a:t>
             </a:fld>
             <a:endParaRPr lang="ko-KR" altLang="en-US"/>
           </a:p>
@@ -1210,14 +1210,14 @@
             <a:pPr algn="ctr"/>
             <a:r>
               <a:rPr lang="ko-KR" altLang="en-US" sz="3200" dirty="0">
-                <a:latin typeface="HY엽서L" panose="02030600000101010101" pitchFamily="18" charset="-127"/>
-                <a:ea typeface="HY엽서L" panose="02030600000101010101" pitchFamily="18" charset="-127"/>
+                <a:latin typeface="궁서체" panose="02030609000101010101" pitchFamily="49" charset="-127"/>
+                <a:ea typeface="궁서체" panose="02030609000101010101" pitchFamily="49" charset="-127"/>
               </a:rPr>
               <a:t>이름</a:t>
             </a:r>
             <a:endParaRPr sz="3200" dirty="0">
-              <a:latin typeface="HY엽서L" panose="02030600000101010101" pitchFamily="18" charset="-127"/>
-              <a:ea typeface="HY엽서L" panose="02030600000101010101" pitchFamily="18" charset="-127"/>
+              <a:latin typeface="궁서체" panose="02030609000101010101" pitchFamily="49" charset="-127"/>
+              <a:ea typeface="궁서체" panose="02030609000101010101" pitchFamily="49" charset="-127"/>
             </a:endParaRPr>
           </a:p>
         </p:txBody>
@@ -1237,7 +1237,7 @@
         <p:spPr>
           <a:xfrm>
             <a:off x="1947863" y="6621397"/>
-            <a:ext cx="1175322" cy="338554"/>
+            <a:ext cx="1279517" cy="338554"/>
           </a:xfrm>
           <a:prstGeom prst="rect">
             <a:avLst/>
@@ -1251,12 +1251,12 @@
           <a:lstStyle/>
           <a:p>
             <a:r>
-              <a:rPr lang="ko-KR" altLang="en-US" sz="1600" dirty="0">
+              <a:rPr lang="ko-KR" altLang="en-US" sz="1600" b="1" dirty="0">
                 <a:solidFill>
                   <a:srgbClr val="194525"/>
                 </a:solidFill>
-                <a:latin typeface="조선신명조" panose="02030504000101010101" pitchFamily="18" charset="-127"/>
-                <a:ea typeface="조선신명조" panose="02030504000101010101" pitchFamily="18" charset="-127"/>
+                <a:latin typeface="바탕" panose="02030600000101010101" pitchFamily="18" charset="-127"/>
+                <a:ea typeface="바탕" panose="02030600000101010101" pitchFamily="18" charset="-127"/>
               </a:rPr>
               <a:t>캠퍼스 역할</a:t>
             </a:r>
@@ -1345,7 +1345,7 @@
         <p:spPr>
           <a:xfrm>
             <a:off x="1947863" y="6621397"/>
-            <a:ext cx="1175322" cy="338554"/>
+            <a:ext cx="1279517" cy="338554"/>
           </a:xfrm>
           <a:prstGeom prst="rect">
             <a:avLst/>
@@ -1359,12 +1359,12 @@
           <a:lstStyle/>
           <a:p>
             <a:r>
-              <a:rPr lang="ko-KR" altLang="en-US" sz="1600" dirty="0">
+              <a:rPr lang="ko-KR" altLang="en-US" sz="1600" b="1" dirty="0">
                 <a:solidFill>
                   <a:srgbClr val="C43F1D"/>
                 </a:solidFill>
-                <a:latin typeface="조선신명조" panose="02030504000101010101" pitchFamily="18" charset="-127"/>
-                <a:ea typeface="조선신명조" panose="02030504000101010101" pitchFamily="18" charset="-127"/>
+                <a:latin typeface="바탕" panose="02030600000101010101" pitchFamily="18" charset="-127"/>
+                <a:ea typeface="바탕" panose="02030600000101010101" pitchFamily="18" charset="-127"/>
               </a:rPr>
               <a:t>캠퍼스 역할</a:t>
             </a:r>
@@ -1402,14 +1402,14 @@
             <a:pPr algn="ctr"/>
             <a:r>
               <a:rPr lang="ko-KR" altLang="en-US" sz="3200" dirty="0">
-                <a:latin typeface="조선신명조" panose="02030504000101010101" pitchFamily="18" charset="-127"/>
-                <a:ea typeface="조선신명조" panose="02030504000101010101" pitchFamily="18" charset="-127"/>
+                <a:latin typeface="궁서체" panose="02030609000101010101" pitchFamily="49" charset="-127"/>
+                <a:ea typeface="궁서체" panose="02030609000101010101" pitchFamily="49" charset="-127"/>
               </a:rPr>
               <a:t>이름</a:t>
             </a:r>
             <a:endParaRPr sz="3200" dirty="0">
-              <a:latin typeface="조선신명조" panose="02030504000101010101" pitchFamily="18" charset="-127"/>
-              <a:ea typeface="조선신명조" panose="02030504000101010101" pitchFamily="18" charset="-127"/>
+              <a:latin typeface="궁서체" panose="02030609000101010101" pitchFamily="49" charset="-127"/>
+              <a:ea typeface="궁서체" panose="02030609000101010101" pitchFamily="49" charset="-127"/>
             </a:endParaRPr>
           </a:p>
         </p:txBody>

</xml_diff>